<commit_message>
modified:   Dokumentation HHZ Rocket Project.pptx
</commit_message>
<xml_diff>
--- a/Dokumentation HHZ Rocket Project.pptx
+++ b/Dokumentation HHZ Rocket Project.pptx
@@ -118,6 +118,11 @@
       </a:defRPr>
     </a:lvl9pPr>
   </p:defaultTextStyle>
+  <p:extLst>
+    <p:ext uri="{EFAFB233-063F-42B5-8137-9DF3F51BA10A}">
+      <p15:sldGuideLst xmlns:p15="http://schemas.microsoft.com/office/powerpoint/2012/main"/>
+    </p:ext>
+  </p:extLst>
 </p:presentation>
 </file>
 
@@ -992,7 +997,7 @@
           <a:p>
             <a:fld id="{18DEE92F-2343-460E-A87F-DC2FD6DE70C4}" type="datetimeFigureOut">
               <a:rPr lang="en-US" smtClean="0"/>
-              <a:t>2/3/2024</a:t>
+              <a:t>2/4/2024</a:t>
             </a:fld>
             <a:endParaRPr lang="en-US"/>
           </a:p>
@@ -1192,7 +1197,7 @@
           <a:p>
             <a:fld id="{18DEE92F-2343-460E-A87F-DC2FD6DE70C4}" type="datetimeFigureOut">
               <a:rPr lang="en-US" smtClean="0"/>
-              <a:t>2/3/2024</a:t>
+              <a:t>2/4/2024</a:t>
             </a:fld>
             <a:endParaRPr lang="en-US"/>
           </a:p>
@@ -1402,7 +1407,7 @@
           <a:p>
             <a:fld id="{18DEE92F-2343-460E-A87F-DC2FD6DE70C4}" type="datetimeFigureOut">
               <a:rPr lang="en-US" smtClean="0"/>
-              <a:t>2/3/2024</a:t>
+              <a:t>2/4/2024</a:t>
             </a:fld>
             <a:endParaRPr lang="en-US"/>
           </a:p>
@@ -1602,7 +1607,7 @@
           <a:p>
             <a:fld id="{18DEE92F-2343-460E-A87F-DC2FD6DE70C4}" type="datetimeFigureOut">
               <a:rPr lang="en-US" smtClean="0"/>
-              <a:t>2/3/2024</a:t>
+              <a:t>2/4/2024</a:t>
             </a:fld>
             <a:endParaRPr lang="en-US"/>
           </a:p>
@@ -1878,7 +1883,7 @@
           <a:p>
             <a:fld id="{18DEE92F-2343-460E-A87F-DC2FD6DE70C4}" type="datetimeFigureOut">
               <a:rPr lang="en-US" smtClean="0"/>
-              <a:t>2/3/2024</a:t>
+              <a:t>2/4/2024</a:t>
             </a:fld>
             <a:endParaRPr lang="en-US"/>
           </a:p>
@@ -2146,7 +2151,7 @@
           <a:p>
             <a:fld id="{18DEE92F-2343-460E-A87F-DC2FD6DE70C4}" type="datetimeFigureOut">
               <a:rPr lang="en-US" smtClean="0"/>
-              <a:t>2/3/2024</a:t>
+              <a:t>2/4/2024</a:t>
             </a:fld>
             <a:endParaRPr lang="en-US"/>
           </a:p>
@@ -2561,7 +2566,7 @@
           <a:p>
             <a:fld id="{18DEE92F-2343-460E-A87F-DC2FD6DE70C4}" type="datetimeFigureOut">
               <a:rPr lang="en-US" smtClean="0"/>
-              <a:t>2/3/2024</a:t>
+              <a:t>2/4/2024</a:t>
             </a:fld>
             <a:endParaRPr lang="en-US"/>
           </a:p>
@@ -2703,7 +2708,7 @@
           <a:p>
             <a:fld id="{18DEE92F-2343-460E-A87F-DC2FD6DE70C4}" type="datetimeFigureOut">
               <a:rPr lang="en-US" smtClean="0"/>
-              <a:t>2/3/2024</a:t>
+              <a:t>2/4/2024</a:t>
             </a:fld>
             <a:endParaRPr lang="en-US"/>
           </a:p>
@@ -2816,7 +2821,7 @@
           <a:p>
             <a:fld id="{18DEE92F-2343-460E-A87F-DC2FD6DE70C4}" type="datetimeFigureOut">
               <a:rPr lang="en-US" smtClean="0"/>
-              <a:t>2/3/2024</a:t>
+              <a:t>2/4/2024</a:t>
             </a:fld>
             <a:endParaRPr lang="en-US"/>
           </a:p>
@@ -3129,7 +3134,7 @@
           <a:p>
             <a:fld id="{18DEE92F-2343-460E-A87F-DC2FD6DE70C4}" type="datetimeFigureOut">
               <a:rPr lang="en-US" smtClean="0"/>
-              <a:t>2/3/2024</a:t>
+              <a:t>2/4/2024</a:t>
             </a:fld>
             <a:endParaRPr lang="en-US"/>
           </a:p>
@@ -3418,7 +3423,7 @@
           <a:p>
             <a:fld id="{18DEE92F-2343-460E-A87F-DC2FD6DE70C4}" type="datetimeFigureOut">
               <a:rPr lang="en-US" smtClean="0"/>
-              <a:t>2/3/2024</a:t>
+              <a:t>2/4/2024</a:t>
             </a:fld>
             <a:endParaRPr lang="en-US"/>
           </a:p>
@@ -3661,7 +3666,7 @@
           <a:p>
             <a:fld id="{18DEE92F-2343-460E-A87F-DC2FD6DE70C4}" type="datetimeFigureOut">
               <a:rPr lang="en-US" smtClean="0"/>
-              <a:t>2/3/2024</a:t>
+              <a:t>2/4/2024</a:t>
             </a:fld>
             <a:endParaRPr lang="en-US"/>
           </a:p>
@@ -4169,7 +4174,7 @@
             </a:r>
             <a:r>
               <a:rPr lang="de-DE" dirty="0" err="1"/>
-              <a:t>Preperation</a:t>
+              <a:t>Preparation</a:t>
             </a:r>
             <a:endParaRPr lang="en-US" dirty="0"/>
           </a:p>
@@ -4257,7 +4262,7 @@
             </a:r>
             <a:r>
               <a:rPr lang="de-DE" dirty="0" err="1"/>
-              <a:t>Preperation</a:t>
+              <a:t>Preparation</a:t>
             </a:r>
             <a:endParaRPr lang="en-US" dirty="0"/>
           </a:p>
@@ -5660,7 +5665,7 @@
           <a:p>
             <a:r>
               <a:rPr lang="de-DE" dirty="0"/>
-              <a:t>Log Date.csv	</a:t>
+              <a:t>Log Datei.csv	</a:t>
             </a:r>
             <a:endParaRPr lang="en-US" dirty="0"/>
           </a:p>
@@ -6152,7 +6157,7 @@
         </p:blipFill>
         <p:spPr>
           <a:xfrm>
-            <a:off x="5052934" y="-1632186"/>
+            <a:off x="5214859" y="-778406"/>
             <a:ext cx="7413379" cy="2469094"/>
           </a:xfrm>
           <a:prstGeom prst="rect">
@@ -6285,7 +6290,7 @@
             </a:r>
             <a:r>
               <a:rPr lang="de-DE" dirty="0" err="1"/>
-              <a:t>Preperation</a:t>
+              <a:t>Preparation</a:t>
             </a:r>
             <a:endParaRPr lang="en-US" dirty="0"/>
           </a:p>
@@ -6310,12 +6315,12 @@
         <p:spPr>
           <a:xfrm>
             <a:off x="838200" y="1825625"/>
-            <a:ext cx="5162550" cy="4351338"/>
+            <a:ext cx="5162550" cy="4667250"/>
           </a:xfrm>
         </p:spPr>
         <p:txBody>
           <a:bodyPr>
-            <a:normAutofit fontScale="92500" lnSpcReduction="20000"/>
+            <a:normAutofit fontScale="85000" lnSpcReduction="20000"/>
           </a:bodyPr>
           <a:lstStyle/>
           <a:p>
@@ -6386,7 +6391,16 @@
             </a:r>
           </a:p>
           <a:p>
-            <a:endParaRPr lang="de-DE" dirty="0"/>
+            <a:r>
+              <a:rPr lang="de-DE" dirty="0"/>
+              <a:t>Neue Features hinzufügen</a:t>
+            </a:r>
+          </a:p>
+          <a:p>
+            <a:r>
+              <a:rPr lang="de-DE" dirty="0"/>
+              <a:t>Daten eventuell normalisieren </a:t>
+            </a:r>
           </a:p>
         </p:txBody>
       </p:sp>

</xml_diff>